<commit_message>
Save points to database
</commit_message>
<xml_diff>
--- a/doc/design.pptx
+++ b/doc/design.pptx
@@ -272,11 +272,11 @@
         </c:dLbls>
         <c:marker val="1"/>
         <c:smooth val="0"/>
-        <c:axId val="414123640"/>
-        <c:axId val="414126616"/>
+        <c:axId val="576211752"/>
+        <c:axId val="576214392"/>
       </c:lineChart>
       <c:catAx>
-        <c:axId val="414123640"/>
+        <c:axId val="576211752"/>
         <c:scaling>
           <c:orientation val="minMax"/>
         </c:scaling>
@@ -286,7 +286,7 @@
         <c:majorTickMark val="out"/>
         <c:minorTickMark val="none"/>
         <c:tickLblPos val="nextTo"/>
-        <c:crossAx val="414126616"/>
+        <c:crossAx val="576214392"/>
         <c:crosses val="autoZero"/>
         <c:auto val="1"/>
         <c:lblAlgn val="ctr"/>
@@ -294,7 +294,7 @@
         <c:noMultiLvlLbl val="0"/>
       </c:catAx>
       <c:valAx>
-        <c:axId val="414126616"/>
+        <c:axId val="576214392"/>
         <c:scaling>
           <c:orientation val="minMax"/>
         </c:scaling>
@@ -305,7 +305,7 @@
         <c:majorTickMark val="out"/>
         <c:minorTickMark val="none"/>
         <c:tickLblPos val="nextTo"/>
-        <c:crossAx val="414123640"/>
+        <c:crossAx val="576211752"/>
         <c:crosses val="autoZero"/>
         <c:crossBetween val="between"/>
       </c:valAx>
@@ -521,7 +521,7 @@
           <a:p>
             <a:fld id="{70BA1CFD-BFF0-48BC-9BA5-4974D7A6AB15}" type="datetimeFigureOut">
               <a:rPr lang="en-US" smtClean="0"/>
-              <a:t>29/06/11</a:t>
+              <a:t>10/07/11</a:t>
             </a:fld>
             <a:endParaRPr lang="en-US"/>
           </a:p>
@@ -878,7 +878,7 @@
           <a:p>
             <a:fld id="{70BA1CFD-BFF0-48BC-9BA5-4974D7A6AB15}" type="datetimeFigureOut">
               <a:rPr lang="en-US" smtClean="0"/>
-              <a:t>29/06/11</a:t>
+              <a:t>10/07/11</a:t>
             </a:fld>
             <a:endParaRPr lang="en-US"/>
           </a:p>
@@ -1047,7 +1047,7 @@
           <a:p>
             <a:fld id="{70BA1CFD-BFF0-48BC-9BA5-4974D7A6AB15}" type="datetimeFigureOut">
               <a:rPr lang="en-US" smtClean="0"/>
-              <a:t>29/06/11</a:t>
+              <a:t>10/07/11</a:t>
             </a:fld>
             <a:endParaRPr lang="en-US"/>
           </a:p>
@@ -1226,7 +1226,7 @@
           <a:p>
             <a:fld id="{70BA1CFD-BFF0-48BC-9BA5-4974D7A6AB15}" type="datetimeFigureOut">
               <a:rPr lang="en-US" smtClean="0"/>
-              <a:t>29/06/11</a:t>
+              <a:t>10/07/11</a:t>
             </a:fld>
             <a:endParaRPr lang="en-US"/>
           </a:p>
@@ -1395,7 +1395,7 @@
           <a:p>
             <a:fld id="{70BA1CFD-BFF0-48BC-9BA5-4974D7A6AB15}" type="datetimeFigureOut">
               <a:rPr lang="en-US" smtClean="0"/>
-              <a:t>29/06/11</a:t>
+              <a:t>10/07/11</a:t>
             </a:fld>
             <a:endParaRPr lang="en-US"/>
           </a:p>
@@ -1672,7 +1672,7 @@
           <a:p>
             <a:fld id="{70BA1CFD-BFF0-48BC-9BA5-4974D7A6AB15}" type="datetimeFigureOut">
               <a:rPr lang="en-US" smtClean="0"/>
-              <a:t>29/06/11</a:t>
+              <a:t>10/07/11</a:t>
             </a:fld>
             <a:endParaRPr lang="en-US"/>
           </a:p>
@@ -1964,7 +1964,7 @@
           <a:p>
             <a:fld id="{70BA1CFD-BFF0-48BC-9BA5-4974D7A6AB15}" type="datetimeFigureOut">
               <a:rPr lang="en-US" smtClean="0"/>
-              <a:t>29/06/11</a:t>
+              <a:t>10/07/11</a:t>
             </a:fld>
             <a:endParaRPr lang="en-US"/>
           </a:p>
@@ -2400,7 +2400,7 @@
           <a:p>
             <a:fld id="{70BA1CFD-BFF0-48BC-9BA5-4974D7A6AB15}" type="datetimeFigureOut">
               <a:rPr lang="en-US" smtClean="0"/>
-              <a:t>29/06/11</a:t>
+              <a:t>10/07/11</a:t>
             </a:fld>
             <a:endParaRPr lang="en-US"/>
           </a:p>
@@ -2513,7 +2513,7 @@
           <a:p>
             <a:fld id="{70BA1CFD-BFF0-48BC-9BA5-4974D7A6AB15}" type="datetimeFigureOut">
               <a:rPr lang="en-US" smtClean="0"/>
-              <a:t>29/06/11</a:t>
+              <a:t>10/07/11</a:t>
             </a:fld>
             <a:endParaRPr lang="en-US"/>
           </a:p>
@@ -2603,7 +2603,7 @@
           <a:p>
             <a:fld id="{70BA1CFD-BFF0-48BC-9BA5-4974D7A6AB15}" type="datetimeFigureOut">
               <a:rPr lang="en-US" smtClean="0"/>
-              <a:t>29/06/11</a:t>
+              <a:t>10/07/11</a:t>
             </a:fld>
             <a:endParaRPr lang="en-US"/>
           </a:p>
@@ -2940,7 +2940,7 @@
           <a:p>
             <a:fld id="{70BA1CFD-BFF0-48BC-9BA5-4974D7A6AB15}" type="datetimeFigureOut">
               <a:rPr lang="en-US" smtClean="0"/>
-              <a:t>29/06/11</a:t>
+              <a:t>10/07/11</a:t>
             </a:fld>
             <a:endParaRPr lang="en-US"/>
           </a:p>
@@ -3255,7 +3255,7 @@
           <a:p>
             <a:fld id="{70BA1CFD-BFF0-48BC-9BA5-4974D7A6AB15}" type="datetimeFigureOut">
               <a:rPr lang="en-US" smtClean="0"/>
-              <a:t>29/06/11</a:t>
+              <a:t>10/07/11</a:t>
             </a:fld>
             <a:endParaRPr lang="en-US"/>
           </a:p>
@@ -3501,7 +3501,7 @@
           <a:p>
             <a:fld id="{70BA1CFD-BFF0-48BC-9BA5-4974D7A6AB15}" type="datetimeFigureOut">
               <a:rPr lang="en-US" smtClean="0"/>
-              <a:t>29/06/11</a:t>
+              <a:t>10/07/11</a:t>
             </a:fld>
             <a:endParaRPr lang="en-US"/>
           </a:p>
@@ -4156,7 +4156,6 @@
               <a:rPr lang="en-US" sz="3200"/>
               <a:t>Players</a:t>
             </a:r>
-            <a:endParaRPr lang="en-US" sz="3200"/>
           </a:p>
         </p:txBody>
       </p:sp>
@@ -4198,7 +4197,6 @@
               <a:rPr lang="en-US" sz="3200"/>
               <a:t>Statistics</a:t>
             </a:r>
-            <a:endParaRPr lang="en-US" sz="3200"/>
           </a:p>
         </p:txBody>
       </p:sp>
@@ -4326,7 +4324,7 @@
           <a:p>
             <a:r>
               <a:rPr lang="en-US" sz="3600"/>
-              <a:t>Player 1:</a:t>
+              <a:t>Player 1*:</a:t>
             </a:r>
           </a:p>
         </p:txBody>
@@ -4398,6 +4396,77 @@
               <a:rPr lang="en-US" sz="3600"/>
               <a:t>Player 2:</a:t>
             </a:r>
+          </a:p>
+        </p:txBody>
+      </p:sp>
+      <p:sp>
+        <p:nvSpPr>
+          <p:cNvPr id="7" name="Rounded Rectangle 6"/>
+          <p:cNvSpPr/>
+          <p:nvPr/>
+        </p:nvSpPr>
+        <p:spPr>
+          <a:xfrm>
+            <a:off x="6335346" y="5823017"/>
+            <a:ext cx="1379998" cy="464493"/>
+          </a:xfrm>
+          <a:prstGeom prst="roundRect">
+            <a:avLst/>
+          </a:prstGeom>
+        </p:spPr>
+        <p:style>
+          <a:lnRef idx="1">
+            <a:schemeClr val="accent5"/>
+          </a:lnRef>
+          <a:fillRef idx="3">
+            <a:schemeClr val="accent5"/>
+          </a:fillRef>
+          <a:effectRef idx="2">
+            <a:schemeClr val="accent5"/>
+          </a:effectRef>
+          <a:fontRef idx="minor">
+            <a:schemeClr val="lt1"/>
+          </a:fontRef>
+        </p:style>
+        <p:txBody>
+          <a:bodyPr rtlCol="0" anchor="ctr"/>
+          <a:lstStyle/>
+          <a:p>
+            <a:pPr algn="ctr"/>
+            <a:r>
+              <a:rPr lang="en-US" sz="2400"/>
+              <a:t>Start</a:t>
+            </a:r>
+          </a:p>
+        </p:txBody>
+      </p:sp>
+      <p:sp>
+        <p:nvSpPr>
+          <p:cNvPr id="8" name="TextBox 7"/>
+          <p:cNvSpPr txBox="1"/>
+          <p:nvPr/>
+        </p:nvSpPr>
+        <p:spPr>
+          <a:xfrm>
+            <a:off x="415968" y="5847251"/>
+            <a:ext cx="5092734" cy="461665"/>
+          </a:xfrm>
+          <a:prstGeom prst="rect">
+            <a:avLst/>
+          </a:prstGeom>
+          <a:noFill/>
+        </p:spPr>
+        <p:txBody>
+          <a:bodyPr wrap="square" rtlCol="0">
+            <a:spAutoFit/>
+          </a:bodyPr>
+          <a:lstStyle/>
+          <a:p>
+            <a:r>
+              <a:rPr lang="en-US" sz="2400"/>
+              <a:t>* This player serves first. </a:t>
+            </a:r>
+            <a:endParaRPr lang="en-US" sz="2400"/>
           </a:p>
         </p:txBody>
       </p:sp>

</xml_diff>